<commit_message>
Add more handouts, Add more details to variables and nasic functions handout. Finish advanced functions handout
</commit_message>
<xml_diff>
--- a/Basic Function.assets/assets.pptx
+++ b/Basic Function.assets/assets.pptx
@@ -6,6 +6,7 @@
   </p:sldMasterIdLst>
   <p:sldIdLst>
     <p:sldId id="256" r:id="rId2"/>
+    <p:sldId id="257" r:id="rId3"/>
   </p:sldIdLst>
   <p:sldSz cx="12192000" cy="6858000"/>
   <p:notesSz cx="6858000" cy="9144000"/>
@@ -104,6 +105,11 @@
       </a:defRPr>
     </a:lvl9pPr>
   </p:defaultTextStyle>
+  <p:extLst>
+    <p:ext uri="{EFAFB233-063F-42B5-8137-9DF3F51BA10A}">
+      <p15:sldGuideLst xmlns:p15="http://schemas.microsoft.com/office/powerpoint/2012/main"/>
+    </p:ext>
+  </p:extLst>
 </p:presentation>
 </file>
 
@@ -254,7 +260,7 @@
           <a:p>
             <a:fld id="{F3744F05-BB0A-49C9-818B-69784089DFE3}" type="datetimeFigureOut">
               <a:rPr lang="en-US" smtClean="0"/>
-              <a:t>5/21/2019</a:t>
+              <a:t>6/16/2019</a:t>
             </a:fld>
             <a:endParaRPr lang="en-US"/>
           </a:p>
@@ -452,7 +458,7 @@
           <a:p>
             <a:fld id="{F3744F05-BB0A-49C9-818B-69784089DFE3}" type="datetimeFigureOut">
               <a:rPr lang="en-US" smtClean="0"/>
-              <a:t>5/21/2019</a:t>
+              <a:t>6/16/2019</a:t>
             </a:fld>
             <a:endParaRPr lang="en-US"/>
           </a:p>
@@ -660,7 +666,7 @@
           <a:p>
             <a:fld id="{F3744F05-BB0A-49C9-818B-69784089DFE3}" type="datetimeFigureOut">
               <a:rPr lang="en-US" smtClean="0"/>
-              <a:t>5/21/2019</a:t>
+              <a:t>6/16/2019</a:t>
             </a:fld>
             <a:endParaRPr lang="en-US"/>
           </a:p>
@@ -858,7 +864,7 @@
           <a:p>
             <a:fld id="{F3744F05-BB0A-49C9-818B-69784089DFE3}" type="datetimeFigureOut">
               <a:rPr lang="en-US" smtClean="0"/>
-              <a:t>5/21/2019</a:t>
+              <a:t>6/16/2019</a:t>
             </a:fld>
             <a:endParaRPr lang="en-US"/>
           </a:p>
@@ -1133,7 +1139,7 @@
           <a:p>
             <a:fld id="{F3744F05-BB0A-49C9-818B-69784089DFE3}" type="datetimeFigureOut">
               <a:rPr lang="en-US" smtClean="0"/>
-              <a:t>5/21/2019</a:t>
+              <a:t>6/16/2019</a:t>
             </a:fld>
             <a:endParaRPr lang="en-US"/>
           </a:p>
@@ -1398,7 +1404,7 @@
           <a:p>
             <a:fld id="{F3744F05-BB0A-49C9-818B-69784089DFE3}" type="datetimeFigureOut">
               <a:rPr lang="en-US" smtClean="0"/>
-              <a:t>5/21/2019</a:t>
+              <a:t>6/16/2019</a:t>
             </a:fld>
             <a:endParaRPr lang="en-US"/>
           </a:p>
@@ -1810,7 +1816,7 @@
           <a:p>
             <a:fld id="{F3744F05-BB0A-49C9-818B-69784089DFE3}" type="datetimeFigureOut">
               <a:rPr lang="en-US" smtClean="0"/>
-              <a:t>5/21/2019</a:t>
+              <a:t>6/16/2019</a:t>
             </a:fld>
             <a:endParaRPr lang="en-US"/>
           </a:p>
@@ -1951,7 +1957,7 @@
           <a:p>
             <a:fld id="{F3744F05-BB0A-49C9-818B-69784089DFE3}" type="datetimeFigureOut">
               <a:rPr lang="en-US" smtClean="0"/>
-              <a:t>5/21/2019</a:t>
+              <a:t>6/16/2019</a:t>
             </a:fld>
             <a:endParaRPr lang="en-US"/>
           </a:p>
@@ -2064,7 +2070,7 @@
           <a:p>
             <a:fld id="{F3744F05-BB0A-49C9-818B-69784089DFE3}" type="datetimeFigureOut">
               <a:rPr lang="en-US" smtClean="0"/>
-              <a:t>5/21/2019</a:t>
+              <a:t>6/16/2019</a:t>
             </a:fld>
             <a:endParaRPr lang="en-US"/>
           </a:p>
@@ -2375,7 +2381,7 @@
           <a:p>
             <a:fld id="{F3744F05-BB0A-49C9-818B-69784089DFE3}" type="datetimeFigureOut">
               <a:rPr lang="en-US" smtClean="0"/>
-              <a:t>5/21/2019</a:t>
+              <a:t>6/16/2019</a:t>
             </a:fld>
             <a:endParaRPr lang="en-US"/>
           </a:p>
@@ -2663,7 +2669,7 @@
           <a:p>
             <a:fld id="{F3744F05-BB0A-49C9-818B-69784089DFE3}" type="datetimeFigureOut">
               <a:rPr lang="en-US" smtClean="0"/>
-              <a:t>5/21/2019</a:t>
+              <a:t>6/16/2019</a:t>
             </a:fld>
             <a:endParaRPr lang="en-US"/>
           </a:p>
@@ -2904,7 +2910,7 @@
           <a:p>
             <a:fld id="{F3744F05-BB0A-49C9-818B-69784089DFE3}" type="datetimeFigureOut">
               <a:rPr lang="en-US" smtClean="0"/>
-              <a:t>5/21/2019</a:t>
+              <a:t>6/16/2019</a:t>
             </a:fld>
             <a:endParaRPr lang="en-US"/>
           </a:p>
@@ -4244,6 +4250,417 @@
     <p:extLst>
       <p:ext uri="{BB962C8B-B14F-4D97-AF65-F5344CB8AC3E}">
         <p14:creationId xmlns:p14="http://schemas.microsoft.com/office/powerpoint/2010/main" val="3023427228"/>
+      </p:ext>
+    </p:extLst>
+  </p:cSld>
+  <p:clrMapOvr>
+    <a:masterClrMapping/>
+  </p:clrMapOvr>
+</p:sld>
+</file>
+
+<file path=ppt/slides/slide2.xml><?xml version="1.0" encoding="utf-8"?>
+<p:sld xmlns:a="http://schemas.openxmlformats.org/drawingml/2006/main" xmlns:r="http://schemas.openxmlformats.org/officeDocument/2006/relationships" xmlns:p="http://schemas.openxmlformats.org/presentationml/2006/main">
+  <p:cSld>
+    <p:spTree>
+      <p:nvGrpSpPr>
+        <p:cNvPr id="1" name=""/>
+        <p:cNvGrpSpPr/>
+        <p:nvPr/>
+      </p:nvGrpSpPr>
+      <p:grpSpPr>
+        <a:xfrm>
+          <a:off x="0" y="0"/>
+          <a:ext cx="0" cy="0"/>
+          <a:chOff x="0" y="0"/>
+          <a:chExt cx="0" cy="0"/>
+        </a:xfrm>
+      </p:grpSpPr>
+      <p:sp>
+        <p:nvSpPr>
+          <p:cNvPr id="5" name="Rectangle: Rounded Corners 4">
+            <a:extLst>
+              <a:ext uri="{FF2B5EF4-FFF2-40B4-BE49-F238E27FC236}">
+                <a16:creationId xmlns:a16="http://schemas.microsoft.com/office/drawing/2014/main" id="{80257592-1A83-480A-BA7B-335F9F0EEA6C}"/>
+              </a:ext>
+            </a:extLst>
+          </p:cNvPr>
+          <p:cNvSpPr/>
+          <p:nvPr/>
+        </p:nvSpPr>
+        <p:spPr>
+          <a:xfrm>
+            <a:off x="2143536" y="2466364"/>
+            <a:ext cx="2227128" cy="1445003"/>
+          </a:xfrm>
+          <a:prstGeom prst="roundRect">
+            <a:avLst/>
+          </a:prstGeom>
+          <a:solidFill>
+            <a:srgbClr val="0070C0"/>
+          </a:solidFill>
+        </p:spPr>
+        <p:style>
+          <a:lnRef idx="2">
+            <a:schemeClr val="accent1"/>
+          </a:lnRef>
+          <a:fillRef idx="1">
+            <a:schemeClr val="lt1"/>
+          </a:fillRef>
+          <a:effectRef idx="0">
+            <a:schemeClr val="accent1"/>
+          </a:effectRef>
+          <a:fontRef idx="minor">
+            <a:schemeClr val="dk1"/>
+          </a:fontRef>
+        </p:style>
+        <p:txBody>
+          <a:bodyPr rtlCol="0" anchor="ctr"/>
+          <a:lstStyle/>
+          <a:p>
+            <a:pPr algn="ctr"/>
+            <a:endParaRPr lang="en-US" sz="2000" dirty="0">
+              <a:latin typeface="Fira Code" panose="020B0509050000020004" pitchFamily="49" charset="0"/>
+              <a:ea typeface="Fira Code" panose="020B0509050000020004" pitchFamily="49" charset="0"/>
+            </a:endParaRPr>
+          </a:p>
+        </p:txBody>
+      </p:sp>
+      <p:sp>
+        <p:nvSpPr>
+          <p:cNvPr id="6" name="TextBox 5">
+            <a:extLst>
+              <a:ext uri="{FF2B5EF4-FFF2-40B4-BE49-F238E27FC236}">
+                <a16:creationId xmlns:a16="http://schemas.microsoft.com/office/drawing/2014/main" id="{61822C38-2EE5-4737-8258-CC74DD5EF389}"/>
+              </a:ext>
+            </a:extLst>
+          </p:cNvPr>
+          <p:cNvSpPr txBox="1"/>
+          <p:nvPr/>
+        </p:nvSpPr>
+        <p:spPr>
+          <a:xfrm>
+            <a:off x="2143536" y="2727200"/>
+            <a:ext cx="2227128" cy="923330"/>
+          </a:xfrm>
+          <a:prstGeom prst="rect">
+            <a:avLst/>
+          </a:prstGeom>
+          <a:noFill/>
+        </p:spPr>
+        <p:txBody>
+          <a:bodyPr wrap="square" rtlCol="0">
+            <a:spAutoFit/>
+          </a:bodyPr>
+          <a:lstStyle/>
+          <a:p>
+            <a:pPr algn="ctr"/>
+            <a:r>
+              <a:rPr lang="en-US" altLang="zh-CN" dirty="0">
+                <a:solidFill>
+                  <a:schemeClr val="bg1"/>
+                </a:solidFill>
+              </a:rPr>
+              <a:t>1. Give the function some data</a:t>
+            </a:r>
+          </a:p>
+          <a:p>
+            <a:pPr algn="ctr"/>
+            <a:r>
+              <a:rPr lang="en-US" dirty="0">
+                <a:solidFill>
+                  <a:schemeClr val="bg1"/>
+                </a:solidFill>
+              </a:rPr>
+              <a:t>(Input)</a:t>
+            </a:r>
+          </a:p>
+        </p:txBody>
+      </p:sp>
+      <p:sp>
+        <p:nvSpPr>
+          <p:cNvPr id="7" name="Rectangle: Rounded Corners 6">
+            <a:extLst>
+              <a:ext uri="{FF2B5EF4-FFF2-40B4-BE49-F238E27FC236}">
+                <a16:creationId xmlns:a16="http://schemas.microsoft.com/office/drawing/2014/main" id="{BD764430-902A-433B-9868-7CC1020B552C}"/>
+              </a:ext>
+            </a:extLst>
+          </p:cNvPr>
+          <p:cNvSpPr/>
+          <p:nvPr/>
+        </p:nvSpPr>
+        <p:spPr>
+          <a:xfrm>
+            <a:off x="5106248" y="2466364"/>
+            <a:ext cx="2227128" cy="1445003"/>
+          </a:xfrm>
+          <a:prstGeom prst="roundRect">
+            <a:avLst/>
+          </a:prstGeom>
+          <a:solidFill>
+            <a:srgbClr val="0070C0"/>
+          </a:solidFill>
+        </p:spPr>
+        <p:style>
+          <a:lnRef idx="2">
+            <a:schemeClr val="accent1"/>
+          </a:lnRef>
+          <a:fillRef idx="1">
+            <a:schemeClr val="lt1"/>
+          </a:fillRef>
+          <a:effectRef idx="0">
+            <a:schemeClr val="accent1"/>
+          </a:effectRef>
+          <a:fontRef idx="minor">
+            <a:schemeClr val="dk1"/>
+          </a:fontRef>
+        </p:style>
+        <p:txBody>
+          <a:bodyPr rtlCol="0" anchor="ctr"/>
+          <a:lstStyle/>
+          <a:p>
+            <a:pPr algn="ctr"/>
+            <a:endParaRPr lang="en-US" sz="2000" dirty="0">
+              <a:latin typeface="Fira Code" panose="020B0509050000020004" pitchFamily="49" charset="0"/>
+              <a:ea typeface="Fira Code" panose="020B0509050000020004" pitchFamily="49" charset="0"/>
+            </a:endParaRPr>
+          </a:p>
+        </p:txBody>
+      </p:sp>
+      <p:sp>
+        <p:nvSpPr>
+          <p:cNvPr id="8" name="TextBox 7">
+            <a:extLst>
+              <a:ext uri="{FF2B5EF4-FFF2-40B4-BE49-F238E27FC236}">
+                <a16:creationId xmlns:a16="http://schemas.microsoft.com/office/drawing/2014/main" id="{BFF55FCE-C23A-4434-883E-593DB5D80280}"/>
+              </a:ext>
+            </a:extLst>
+          </p:cNvPr>
+          <p:cNvSpPr txBox="1"/>
+          <p:nvPr/>
+        </p:nvSpPr>
+        <p:spPr>
+          <a:xfrm>
+            <a:off x="5106248" y="2727200"/>
+            <a:ext cx="2227128" cy="923330"/>
+          </a:xfrm>
+          <a:prstGeom prst="rect">
+            <a:avLst/>
+          </a:prstGeom>
+          <a:noFill/>
+        </p:spPr>
+        <p:txBody>
+          <a:bodyPr wrap="square" rtlCol="0">
+            <a:spAutoFit/>
+          </a:bodyPr>
+          <a:lstStyle/>
+          <a:p>
+            <a:pPr algn="ctr"/>
+            <a:r>
+              <a:rPr lang="en-US" altLang="zh-CN" dirty="0">
+                <a:solidFill>
+                  <a:schemeClr val="bg1"/>
+                </a:solidFill>
+              </a:rPr>
+              <a:t>2. Let the function do something to/based on the data</a:t>
+            </a:r>
+            <a:endParaRPr lang="en-US" dirty="0">
+              <a:solidFill>
+                <a:schemeClr val="bg1"/>
+              </a:solidFill>
+            </a:endParaRPr>
+          </a:p>
+        </p:txBody>
+      </p:sp>
+      <p:sp>
+        <p:nvSpPr>
+          <p:cNvPr id="9" name="Rectangle: Rounded Corners 8">
+            <a:extLst>
+              <a:ext uri="{FF2B5EF4-FFF2-40B4-BE49-F238E27FC236}">
+                <a16:creationId xmlns:a16="http://schemas.microsoft.com/office/drawing/2014/main" id="{EE631C95-9595-4CD1-AF9C-9F01DEDB1C3E}"/>
+              </a:ext>
+            </a:extLst>
+          </p:cNvPr>
+          <p:cNvSpPr/>
+          <p:nvPr/>
+        </p:nvSpPr>
+        <p:spPr>
+          <a:xfrm>
+            <a:off x="8068960" y="2466364"/>
+            <a:ext cx="2227128" cy="1445003"/>
+          </a:xfrm>
+          <a:prstGeom prst="roundRect">
+            <a:avLst/>
+          </a:prstGeom>
+          <a:solidFill>
+            <a:srgbClr val="0070C0"/>
+          </a:solidFill>
+        </p:spPr>
+        <p:style>
+          <a:lnRef idx="2">
+            <a:schemeClr val="accent1"/>
+          </a:lnRef>
+          <a:fillRef idx="1">
+            <a:schemeClr val="lt1"/>
+          </a:fillRef>
+          <a:effectRef idx="0">
+            <a:schemeClr val="accent1"/>
+          </a:effectRef>
+          <a:fontRef idx="minor">
+            <a:schemeClr val="dk1"/>
+          </a:fontRef>
+        </p:style>
+        <p:txBody>
+          <a:bodyPr rtlCol="0" anchor="ctr"/>
+          <a:lstStyle/>
+          <a:p>
+            <a:pPr algn="ctr"/>
+            <a:endParaRPr lang="en-US" sz="2000" dirty="0">
+              <a:latin typeface="Fira Code" panose="020B0509050000020004" pitchFamily="49" charset="0"/>
+              <a:ea typeface="Fira Code" panose="020B0509050000020004" pitchFamily="49" charset="0"/>
+            </a:endParaRPr>
+          </a:p>
+        </p:txBody>
+      </p:sp>
+      <p:sp>
+        <p:nvSpPr>
+          <p:cNvPr id="10" name="TextBox 9">
+            <a:extLst>
+              <a:ext uri="{FF2B5EF4-FFF2-40B4-BE49-F238E27FC236}">
+                <a16:creationId xmlns:a16="http://schemas.microsoft.com/office/drawing/2014/main" id="{9146D41C-76B0-4030-A8EA-E6D916F2715F}"/>
+              </a:ext>
+            </a:extLst>
+          </p:cNvPr>
+          <p:cNvSpPr txBox="1"/>
+          <p:nvPr/>
+        </p:nvSpPr>
+        <p:spPr>
+          <a:xfrm>
+            <a:off x="8068960" y="2727200"/>
+            <a:ext cx="2227128" cy="923330"/>
+          </a:xfrm>
+          <a:prstGeom prst="rect">
+            <a:avLst/>
+          </a:prstGeom>
+          <a:noFill/>
+        </p:spPr>
+        <p:txBody>
+          <a:bodyPr wrap="square" rtlCol="0">
+            <a:spAutoFit/>
+          </a:bodyPr>
+          <a:lstStyle/>
+          <a:p>
+            <a:pPr algn="ctr"/>
+            <a:r>
+              <a:rPr lang="en-US" altLang="zh-CN" dirty="0">
+                <a:solidFill>
+                  <a:schemeClr val="bg1"/>
+                </a:solidFill>
+              </a:rPr>
+              <a:t>3. Get new data from the function</a:t>
+            </a:r>
+          </a:p>
+          <a:p>
+            <a:pPr algn="ctr"/>
+            <a:r>
+              <a:rPr lang="en-US" dirty="0">
+                <a:solidFill>
+                  <a:schemeClr val="bg1"/>
+                </a:solidFill>
+              </a:rPr>
+              <a:t>(Output)</a:t>
+            </a:r>
+          </a:p>
+        </p:txBody>
+      </p:sp>
+      <p:cxnSp>
+        <p:nvCxnSpPr>
+          <p:cNvPr id="12" name="Straight Arrow Connector 11">
+            <a:extLst>
+              <a:ext uri="{FF2B5EF4-FFF2-40B4-BE49-F238E27FC236}">
+                <a16:creationId xmlns:a16="http://schemas.microsoft.com/office/drawing/2014/main" id="{43AFE7CA-4F70-4425-837F-AC7D6FEA3FD3}"/>
+              </a:ext>
+            </a:extLst>
+          </p:cNvPr>
+          <p:cNvCxnSpPr>
+            <a:stCxn id="6" idx="3"/>
+            <a:endCxn id="8" idx="1"/>
+          </p:cNvCxnSpPr>
+          <p:nvPr/>
+        </p:nvCxnSpPr>
+        <p:spPr>
+          <a:xfrm>
+            <a:off x="4370664" y="3188865"/>
+            <a:ext cx="735584" cy="0"/>
+          </a:xfrm>
+          <a:prstGeom prst="straightConnector1">
+            <a:avLst/>
+          </a:prstGeom>
+          <a:ln w="38100">
+            <a:tailEnd type="triangle"/>
+          </a:ln>
+        </p:spPr>
+        <p:style>
+          <a:lnRef idx="1">
+            <a:schemeClr val="dk1"/>
+          </a:lnRef>
+          <a:fillRef idx="0">
+            <a:schemeClr val="dk1"/>
+          </a:fillRef>
+          <a:effectRef idx="0">
+            <a:schemeClr val="dk1"/>
+          </a:effectRef>
+          <a:fontRef idx="minor">
+            <a:schemeClr val="tx1"/>
+          </a:fontRef>
+        </p:style>
+      </p:cxnSp>
+      <p:cxnSp>
+        <p:nvCxnSpPr>
+          <p:cNvPr id="14" name="Straight Arrow Connector 13">
+            <a:extLst>
+              <a:ext uri="{FF2B5EF4-FFF2-40B4-BE49-F238E27FC236}">
+                <a16:creationId xmlns:a16="http://schemas.microsoft.com/office/drawing/2014/main" id="{F4797E72-5614-4D35-804B-6C9DF2D9945C}"/>
+              </a:ext>
+            </a:extLst>
+          </p:cNvPr>
+          <p:cNvCxnSpPr>
+            <a:stCxn id="8" idx="3"/>
+            <a:endCxn id="9" idx="1"/>
+          </p:cNvCxnSpPr>
+          <p:nvPr/>
+        </p:nvCxnSpPr>
+        <p:spPr>
+          <a:xfrm>
+            <a:off x="7333376" y="3188865"/>
+            <a:ext cx="735584" cy="1"/>
+          </a:xfrm>
+          <a:prstGeom prst="straightConnector1">
+            <a:avLst/>
+          </a:prstGeom>
+          <a:ln w="38100">
+            <a:tailEnd type="triangle"/>
+          </a:ln>
+        </p:spPr>
+        <p:style>
+          <a:lnRef idx="1">
+            <a:schemeClr val="dk1"/>
+          </a:lnRef>
+          <a:fillRef idx="0">
+            <a:schemeClr val="dk1"/>
+          </a:fillRef>
+          <a:effectRef idx="0">
+            <a:schemeClr val="dk1"/>
+          </a:effectRef>
+          <a:fontRef idx="minor">
+            <a:schemeClr val="tx1"/>
+          </a:fontRef>
+        </p:style>
+      </p:cxnSp>
+    </p:spTree>
+    <p:extLst>
+      <p:ext uri="{BB962C8B-B14F-4D97-AF65-F5344CB8AC3E}">
+        <p14:creationId xmlns:p14="http://schemas.microsoft.com/office/powerpoint/2010/main" val="1156720865"/>
       </p:ext>
     </p:extLst>
   </p:cSld>

</xml_diff>